<commit_message>
update the SASRec reproduction after the meeting
</commit_message>
<xml_diff>
--- a/week1/Dissertation_1.pptx
+++ b/week1/Dissertation_1.pptx
@@ -201,7 +201,7 @@
           <a:p>
             <a:fld id="{5551B73A-00A5-41F0-AD1E-E8BC06CD57C4}" type="datetimeFigureOut">
               <a:rPr lang="zh-CN" altLang="en-US" smtClean="0"/>
-              <a:t>2023/6/5</a:t>
+              <a:t>2023/6/6</a:t>
             </a:fld>
             <a:endParaRPr lang="zh-CN" altLang="en-US"/>
           </a:p>
@@ -615,7 +615,7 @@
           <a:p>
             <a:fld id="{2737B94B-463C-4A10-B31F-5D6631A642E2}" type="datetimeFigureOut">
               <a:rPr lang="zh-CN" altLang="en-US" smtClean="0"/>
-              <a:t>2023/6/5</a:t>
+              <a:t>2023/6/6</a:t>
             </a:fld>
             <a:endParaRPr lang="zh-CN" altLang="en-US"/>
           </a:p>
@@ -813,7 +813,7 @@
           <a:p>
             <a:fld id="{2737B94B-463C-4A10-B31F-5D6631A642E2}" type="datetimeFigureOut">
               <a:rPr lang="zh-CN" altLang="en-US" smtClean="0"/>
-              <a:t>2023/6/5</a:t>
+              <a:t>2023/6/6</a:t>
             </a:fld>
             <a:endParaRPr lang="zh-CN" altLang="en-US"/>
           </a:p>
@@ -1021,7 +1021,7 @@
           <a:p>
             <a:fld id="{2737B94B-463C-4A10-B31F-5D6631A642E2}" type="datetimeFigureOut">
               <a:rPr lang="zh-CN" altLang="en-US" smtClean="0"/>
-              <a:t>2023/6/5</a:t>
+              <a:t>2023/6/6</a:t>
             </a:fld>
             <a:endParaRPr lang="zh-CN" altLang="en-US"/>
           </a:p>
@@ -1615,7 +1615,7 @@
           <a:p>
             <a:fld id="{2737B94B-463C-4A10-B31F-5D6631A642E2}" type="datetimeFigureOut">
               <a:rPr lang="zh-CN" altLang="en-US" smtClean="0"/>
-              <a:t>2023/6/5</a:t>
+              <a:t>2023/6/6</a:t>
             </a:fld>
             <a:endParaRPr lang="zh-CN" altLang="en-US"/>
           </a:p>
@@ -1890,7 +1890,7 @@
           <a:p>
             <a:fld id="{2737B94B-463C-4A10-B31F-5D6631A642E2}" type="datetimeFigureOut">
               <a:rPr lang="zh-CN" altLang="en-US" smtClean="0"/>
-              <a:t>2023/6/5</a:t>
+              <a:t>2023/6/6</a:t>
             </a:fld>
             <a:endParaRPr lang="zh-CN" altLang="en-US"/>
           </a:p>
@@ -2155,7 +2155,7 @@
           <a:p>
             <a:fld id="{2737B94B-463C-4A10-B31F-5D6631A642E2}" type="datetimeFigureOut">
               <a:rPr lang="zh-CN" altLang="en-US" smtClean="0"/>
-              <a:t>2023/6/5</a:t>
+              <a:t>2023/6/6</a:t>
             </a:fld>
             <a:endParaRPr lang="zh-CN" altLang="en-US"/>
           </a:p>
@@ -2567,7 +2567,7 @@
           <a:p>
             <a:fld id="{2737B94B-463C-4A10-B31F-5D6631A642E2}" type="datetimeFigureOut">
               <a:rPr lang="zh-CN" altLang="en-US" smtClean="0"/>
-              <a:t>2023/6/5</a:t>
+              <a:t>2023/6/6</a:t>
             </a:fld>
             <a:endParaRPr lang="zh-CN" altLang="en-US"/>
           </a:p>
@@ -2708,7 +2708,7 @@
           <a:p>
             <a:fld id="{2737B94B-463C-4A10-B31F-5D6631A642E2}" type="datetimeFigureOut">
               <a:rPr lang="zh-CN" altLang="en-US" smtClean="0"/>
-              <a:t>2023/6/5</a:t>
+              <a:t>2023/6/6</a:t>
             </a:fld>
             <a:endParaRPr lang="zh-CN" altLang="en-US"/>
           </a:p>
@@ -2821,7 +2821,7 @@
           <a:p>
             <a:fld id="{2737B94B-463C-4A10-B31F-5D6631A642E2}" type="datetimeFigureOut">
               <a:rPr lang="zh-CN" altLang="en-US" smtClean="0"/>
-              <a:t>2023/6/5</a:t>
+              <a:t>2023/6/6</a:t>
             </a:fld>
             <a:endParaRPr lang="zh-CN" altLang="en-US"/>
           </a:p>
@@ -3132,7 +3132,7 @@
           <a:p>
             <a:fld id="{2737B94B-463C-4A10-B31F-5D6631A642E2}" type="datetimeFigureOut">
               <a:rPr lang="zh-CN" altLang="en-US" smtClean="0"/>
-              <a:t>2023/6/5</a:t>
+              <a:t>2023/6/6</a:t>
             </a:fld>
             <a:endParaRPr lang="zh-CN" altLang="en-US"/>
           </a:p>
@@ -3420,7 +3420,7 @@
           <a:p>
             <a:fld id="{2737B94B-463C-4A10-B31F-5D6631A642E2}" type="datetimeFigureOut">
               <a:rPr lang="zh-CN" altLang="en-US" smtClean="0"/>
-              <a:t>2023/6/5</a:t>
+              <a:t>2023/6/6</a:t>
             </a:fld>
             <a:endParaRPr lang="zh-CN" altLang="en-US"/>
           </a:p>
@@ -3661,7 +3661,7 @@
           <a:p>
             <a:fld id="{2737B94B-463C-4A10-B31F-5D6631A642E2}" type="datetimeFigureOut">
               <a:rPr lang="zh-CN" altLang="en-US" smtClean="0"/>
-              <a:t>2023/6/5</a:t>
+              <a:t>2023/6/6</a:t>
             </a:fld>
             <a:endParaRPr lang="zh-CN" altLang="en-US"/>
           </a:p>
@@ -4251,7 +4251,7 @@
         </p:spPr>
         <p:txBody>
           <a:bodyPr>
-            <a:normAutofit fontScale="92500" lnSpcReduction="10000"/>
+            <a:normAutofit fontScale="92500" lnSpcReduction="20000"/>
           </a:bodyPr>
           <a:lstStyle/>
           <a:p>
@@ -4474,7 +4474,14 @@
               <a:rPr lang="en-US" altLang="zh-CN" sz="2000" dirty="0"/>
               <a:t>(diversity of interest)</a:t>
             </a:r>
-            <a:endParaRPr lang="en-US" altLang="zh-CN" dirty="0"/>
+          </a:p>
+          <a:p>
+            <a:pPr lvl="1"/>
+            <a:r>
+              <a:rPr lang="en-GB" altLang="zh-CN" sz="2100" dirty="0"/>
+              <a:t>How well each can predict all future purchases over the next k days</a:t>
+            </a:r>
+            <a:endParaRPr lang="en-US" altLang="zh-CN" sz="2100" dirty="0"/>
           </a:p>
           <a:p>
             <a:endParaRPr lang="en-US" altLang="zh-CN" dirty="0"/>
@@ -4863,7 +4870,7 @@
           <a:p>
             <a:r>
               <a:rPr lang="en-US" altLang="zh-CN" dirty="0"/>
-              <a:t>Future steps (This week</a:t>
+              <a:t>Future steps (This week)</a:t>
             </a:r>
             <a:endParaRPr lang="zh-CN" altLang="en-US" dirty="0"/>
           </a:p>

</xml_diff>